<commit_message>
Add names to presentation
</commit_message>
<xml_diff>
--- a/Presentatione_NMPDE_Navier_Stokes_temp.pptx
+++ b/Presentatione_NMPDE_Navier_Stokes_temp.pptx
@@ -325,7 +325,7 @@
             <a:pPr rtl="0"/>
             <a:fld id="{04360E59-1627-4404-ACC5-51C744AB0F27}" type="slidenum">
               <a:rPr lang="it-IT" smtClean="0"/>
-              <a:t>‹N›</a:t>
+              <a:t>‹#›</a:t>
             </a:fld>
             <a:endParaRPr lang="it-IT" dirty="0"/>
           </a:p>
@@ -603,8 +603,8 @@
             <a:pPr rtl="0"/>
             <a:fld id="{841221E5-7225-48EB-A4EE-420E7BFCF705}" type="slidenum">
               <a:rPr lang="it-IT" smtClean="0"/>
-              <a:pPr/>
-              <a:t>‹N›</a:t>
+              <a:pPr rtl="0"/>
+              <a:t>‹#›</a:t>
             </a:fld>
             <a:endParaRPr lang="it-IT" dirty="0"/>
           </a:p>
@@ -2904,8 +2904,8 @@
             <a:pPr rtl="0"/>
             <a:fld id="{7DC1BBB0-96F0-4077-A278-0F3FB5C104D3}" type="slidenum">
               <a:rPr lang="it-IT" smtClean="0"/>
-              <a:pPr/>
-              <a:t>‹N›</a:t>
+              <a:pPr rtl="0"/>
+              <a:t>‹#›</a:t>
             </a:fld>
             <a:endParaRPr lang="it-IT" dirty="0"/>
           </a:p>
@@ -3114,7 +3114,7 @@
             <a:pPr rtl="0"/>
             <a:fld id="{7DC1BBB0-96F0-4077-A278-0F3FB5C104D3}" type="slidenum">
               <a:rPr lang="it-IT" smtClean="0"/>
-              <a:t>‹N›</a:t>
+              <a:t>‹#›</a:t>
             </a:fld>
             <a:endParaRPr lang="it-IT" dirty="0"/>
           </a:p>
@@ -3940,7 +3940,7 @@
             <a:pPr rtl="0"/>
             <a:fld id="{7DC1BBB0-96F0-4077-A278-0F3FB5C104D3}" type="slidenum">
               <a:rPr lang="it-IT" smtClean="0"/>
-              <a:t>‹N›</a:t>
+              <a:t>‹#›</a:t>
             </a:fld>
             <a:endParaRPr lang="it-IT" dirty="0"/>
           </a:p>
@@ -4149,7 +4149,7 @@
             <a:pPr rtl="0"/>
             <a:fld id="{7DC1BBB0-96F0-4077-A278-0F3FB5C104D3}" type="slidenum">
               <a:rPr lang="it-IT" smtClean="0"/>
-              <a:t>‹N›</a:t>
+              <a:t>‹#›</a:t>
             </a:fld>
             <a:endParaRPr lang="it-IT" dirty="0"/>
           </a:p>
@@ -5439,8 +5439,8 @@
             <a:pPr rtl="0"/>
             <a:fld id="{7DC1BBB0-96F0-4077-A278-0F3FB5C104D3}" type="slidenum">
               <a:rPr lang="it-IT" smtClean="0"/>
-              <a:pPr/>
-              <a:t>‹N›</a:t>
+              <a:pPr rtl="0"/>
+              <a:t>‹#›</a:t>
             </a:fld>
             <a:endParaRPr lang="it-IT" dirty="0"/>
           </a:p>
@@ -5751,7 +5751,7 @@
             <a:pPr rtl="0"/>
             <a:fld id="{7DC1BBB0-96F0-4077-A278-0F3FB5C104D3}" type="slidenum">
               <a:rPr lang="it-IT" smtClean="0"/>
-              <a:t>‹N›</a:t>
+              <a:t>‹#›</a:t>
             </a:fld>
             <a:endParaRPr lang="it-IT" dirty="0"/>
           </a:p>
@@ -6210,7 +6210,7 @@
             <a:pPr rtl="0"/>
             <a:fld id="{7DC1BBB0-96F0-4077-A278-0F3FB5C104D3}" type="slidenum">
               <a:rPr lang="it-IT" smtClean="0"/>
-              <a:t>‹N›</a:t>
+              <a:t>‹#›</a:t>
             </a:fld>
             <a:endParaRPr lang="it-IT" dirty="0"/>
           </a:p>
@@ -6351,7 +6351,7 @@
             <a:pPr rtl="0"/>
             <a:fld id="{7DC1BBB0-96F0-4077-A278-0F3FB5C104D3}" type="slidenum">
               <a:rPr lang="it-IT" smtClean="0"/>
-              <a:t>‹N›</a:t>
+              <a:t>‹#›</a:t>
             </a:fld>
             <a:endParaRPr lang="it-IT" dirty="0"/>
           </a:p>
@@ -6704,8 +6704,8 @@
             <a:pPr rtl="0"/>
             <a:fld id="{7DC1BBB0-96F0-4077-A278-0F3FB5C104D3}" type="slidenum">
               <a:rPr lang="it-IT" smtClean="0"/>
-              <a:pPr/>
-              <a:t>‹N›</a:t>
+              <a:pPr rtl="0"/>
+              <a:t>‹#›</a:t>
             </a:fld>
             <a:endParaRPr lang="it-IT" dirty="0"/>
           </a:p>
@@ -7199,7 +7199,7 @@
             <a:pPr rtl="0"/>
             <a:fld id="{7DC1BBB0-96F0-4077-A278-0F3FB5C104D3}" type="slidenum">
               <a:rPr lang="it-IT" smtClean="0"/>
-              <a:t>‹N›</a:t>
+              <a:t>‹#›</a:t>
             </a:fld>
             <a:endParaRPr lang="it-IT" dirty="0"/>
           </a:p>
@@ -7671,8 +7671,8 @@
             <a:pPr rtl="0"/>
             <a:fld id="{7DC1BBB0-96F0-4077-A278-0F3FB5C104D3}" type="slidenum">
               <a:rPr lang="it-IT" smtClean="0"/>
-              <a:pPr/>
-              <a:t>‹N›</a:t>
+              <a:pPr rtl="0"/>
+              <a:t>‹#›</a:t>
             </a:fld>
             <a:endParaRPr lang="it-IT" dirty="0"/>
           </a:p>
@@ -8590,8 +8590,8 @@
             <a:pPr rtl="0"/>
             <a:fld id="{7DC1BBB0-96F0-4077-A278-0F3FB5C104D3}" type="slidenum">
               <a:rPr lang="it-IT" smtClean="0"/>
-              <a:pPr/>
-              <a:t>‹N›</a:t>
+              <a:pPr rtl="0"/>
+              <a:t>‹#›</a:t>
             </a:fld>
             <a:endParaRPr lang="it-IT" dirty="0"/>
           </a:p>
@@ -9046,6 +9046,45 @@
           </a:p>
         </p:txBody>
       </p:sp>
+      <p:sp>
+        <p:nvSpPr>
+          <p:cNvPr id="4" name="TextBox 3">
+            <a:extLst>
+              <a:ext uri="{FF2B5EF4-FFF2-40B4-BE49-F238E27FC236}">
+                <a16:creationId xmlns:a16="http://schemas.microsoft.com/office/drawing/2014/main" id="{F4A17D8A-1E9E-5281-CCC7-B223405D6C8C}"/>
+              </a:ext>
+            </a:extLst>
+          </p:cNvPr>
+          <p:cNvSpPr txBox="1"/>
+          <p:nvPr/>
+        </p:nvSpPr>
+        <p:spPr>
+          <a:xfrm>
+            <a:off x="2243714" y="5877272"/>
+            <a:ext cx="9145016" cy="707886"/>
+          </a:xfrm>
+          <a:prstGeom prst="rect">
+            <a:avLst/>
+          </a:prstGeom>
+          <a:noFill/>
+        </p:spPr>
+        <p:txBody>
+          <a:bodyPr wrap="square" rtlCol="0">
+            <a:spAutoFit/>
+          </a:bodyPr>
+          <a:lstStyle/>
+          <a:p>
+            <a:r>
+              <a:rPr lang="it-IT" sz="4000" dirty="0">
+                <a:solidFill>
+                  <a:schemeClr val="tx2"/>
+                </a:solidFill>
+              </a:rPr>
+              <a:t>Foderà Simone – Rigamonti Matteo</a:t>
+            </a:r>
+          </a:p>
+        </p:txBody>
+      </p:sp>
     </p:spTree>
     <p:extLst>
       <p:ext uri="{BB962C8B-B14F-4D97-AF65-F5344CB8AC3E}">
@@ -11622,13 +11661,13 @@
   <p:clrMapOvr>
     <a:masterClrMapping/>
   </p:clrMapOvr>
-  <mc:AlternateContent xmlns:mc="http://schemas.openxmlformats.org/markup-compatibility/2006">
-    <mc:Choice xmlns:p14="http://schemas.microsoft.com/office/powerpoint/2010/main" Requires="p14">
+  <mc:AlternateContent xmlns:mc="http://schemas.openxmlformats.org/markup-compatibility/2006" xmlns:p14="http://schemas.microsoft.com/office/powerpoint/2010/main">
+    <mc:Choice Requires="p14">
       <p:transition spd="med" p14:dur="700">
         <p:fade/>
       </p:transition>
     </mc:Choice>
-    <mc:Fallback>
+    <mc:Fallback xmlns="">
       <p:transition spd="med">
         <p:fade/>
       </p:transition>

</xml_diff>